<commit_message>
Added Single-Container Management Pattern
</commit_message>
<xml_diff>
--- a/insights.pptx
+++ b/insights.pptx
@@ -7278,8 +7278,8 @@
         </p:nvSpPr>
         <p:spPr>
           <a:xfrm>
-            <a:off x="755607" y="1255571"/>
-            <a:ext cx="7815943" cy="400110"/>
+            <a:off x="504358" y="1407575"/>
+            <a:ext cx="7815943" cy="523220"/>
           </a:xfrm>
           <a:prstGeom prst="rect">
             <a:avLst/>
@@ -7293,14 +7293,14 @@
           <a:lstStyle/>
           <a:p>
             <a:r>
-              <a:rPr lang="nb-NO" sz="2000" dirty="0" smtClean="0"/>
+              <a:rPr lang="nb-NO" sz="2800" dirty="0" smtClean="0"/>
               <a:t>Single-Container-Management </a:t>
             </a:r>
             <a:r>
-              <a:rPr lang="nb-NO" sz="2000" dirty="0" err="1" smtClean="0"/>
+              <a:rPr lang="nb-NO" sz="2800" dirty="0" err="1" smtClean="0"/>
               <a:t>Pattern</a:t>
             </a:r>
-            <a:endParaRPr lang="en-US" sz="2000" dirty="0"/>
+            <a:endParaRPr lang="en-US" sz="2800" dirty="0"/>
           </a:p>
         </p:txBody>
       </p:sp>
@@ -7312,8 +7312,8 @@
         </p:nvSpPr>
         <p:spPr>
           <a:xfrm>
-            <a:off x="740228" y="760916"/>
-            <a:ext cx="10189030" cy="600164"/>
+            <a:off x="504358" y="529849"/>
+            <a:ext cx="10189030" cy="999697"/>
           </a:xfrm>
           <a:prstGeom prst="rect">
             <a:avLst/>
@@ -7326,67 +7326,75 @@
           </a:bodyPr>
           <a:lstStyle/>
           <a:p>
-            <a:r>
-              <a:rPr lang="nb-NO" sz="3300" dirty="0" smtClean="0"/>
+            <a:pPr>
+              <a:lnSpc>
+                <a:spcPts val="3500"/>
+              </a:lnSpc>
+            </a:pPr>
+            <a:r>
+              <a:rPr lang="nb-NO" sz="3600" b="1" dirty="0" smtClean="0"/>
               <a:t>A </a:t>
             </a:r>
             <a:r>
-              <a:rPr lang="nb-NO" sz="3300" dirty="0" err="1" smtClean="0"/>
+              <a:rPr lang="nb-NO" sz="3600" b="1" dirty="0" err="1" smtClean="0"/>
               <a:t>rich</a:t>
             </a:r>
             <a:r>
-              <a:rPr lang="nb-NO" sz="3300" dirty="0" smtClean="0"/>
-              <a:t> management </a:t>
-            </a:r>
-            <a:r>
-              <a:rPr lang="nb-NO" sz="3300" dirty="0" err="1" smtClean="0"/>
+              <a:rPr lang="nb-NO" sz="3600" b="1" dirty="0" smtClean="0"/>
+              <a:t> container management </a:t>
+            </a:r>
+            <a:r>
+              <a:rPr lang="nb-NO" sz="3600" b="1" dirty="0" err="1" smtClean="0"/>
               <a:t>interface</a:t>
             </a:r>
             <a:r>
-              <a:rPr lang="nb-NO" sz="3300" dirty="0" smtClean="0"/>
+              <a:rPr lang="nb-NO" sz="3600" b="1" dirty="0" smtClean="0"/>
               <a:t> </a:t>
             </a:r>
-            <a:r>
-              <a:rPr lang="nb-NO" sz="3300" dirty="0" err="1" smtClean="0"/>
+            <a:br>
+              <a:rPr lang="nb-NO" sz="3600" b="1" dirty="0" smtClean="0"/>
+            </a:br>
+            <a:r>
+              <a:rPr lang="nb-NO" sz="3600" b="1" dirty="0" err="1" smtClean="0"/>
               <a:t>will</a:t>
             </a:r>
             <a:r>
-              <a:rPr lang="nb-NO" sz="3300" dirty="0" smtClean="0"/>
+              <a:rPr lang="nb-NO" sz="3600" b="1" dirty="0" smtClean="0"/>
               <a:t> </a:t>
             </a:r>
             <a:r>
-              <a:rPr lang="nb-NO" sz="3300" dirty="0" err="1" smtClean="0"/>
+              <a:rPr lang="nb-NO" sz="3600" b="1" dirty="0" err="1" smtClean="0"/>
               <a:t>give</a:t>
             </a:r>
             <a:r>
-              <a:rPr lang="nb-NO" sz="3300" dirty="0" smtClean="0"/>
+              <a:rPr lang="nb-NO" sz="3600" b="1" dirty="0" smtClean="0"/>
               <a:t> </a:t>
             </a:r>
             <a:r>
-              <a:rPr lang="nb-NO" sz="3300" dirty="0" err="1" smtClean="0"/>
+              <a:rPr lang="nb-NO" sz="3600" b="1" dirty="0" err="1" smtClean="0"/>
               <a:t>you</a:t>
             </a:r>
             <a:r>
-              <a:rPr lang="nb-NO" sz="3300" dirty="0" smtClean="0"/>
+              <a:rPr lang="nb-NO" sz="3600" b="1" dirty="0" smtClean="0"/>
               <a:t> </a:t>
             </a:r>
             <a:r>
-              <a:rPr lang="nb-NO" sz="3300" dirty="0" err="1" smtClean="0"/>
+              <a:rPr lang="nb-NO" sz="3600" b="1" dirty="0" err="1" smtClean="0"/>
               <a:t>better</a:t>
             </a:r>
             <a:r>
-              <a:rPr lang="nb-NO" sz="3300" dirty="0" smtClean="0"/>
+              <a:rPr lang="nb-NO" sz="3600" b="1" dirty="0" smtClean="0"/>
               <a:t> </a:t>
             </a:r>
             <a:r>
-              <a:rPr lang="nb-NO" sz="3300" dirty="0" err="1" smtClean="0"/>
+              <a:rPr lang="nb-NO" sz="3600" b="1" dirty="0" err="1" smtClean="0"/>
               <a:t>control</a:t>
             </a:r>
             <a:r>
-              <a:rPr lang="nb-NO" sz="3300" dirty="0" smtClean="0"/>
+              <a:rPr lang="nb-NO" sz="3600" b="1" dirty="0" smtClean="0"/>
               <a:t>.</a:t>
             </a:r>
-            <a:endParaRPr lang="en-US" sz="3300" dirty="0"/>
+            <a:endParaRPr lang="en-US" sz="3600" b="1" dirty="0"/>
           </a:p>
         </p:txBody>
       </p:sp>
@@ -7398,8 +7406,8 @@
         </p:nvSpPr>
         <p:spPr>
           <a:xfrm>
-            <a:off x="9418903" y="5484717"/>
-            <a:ext cx="1062344" cy="307777"/>
+            <a:off x="9253971" y="5467689"/>
+            <a:ext cx="1413980" cy="401321"/>
           </a:xfrm>
           <a:prstGeom prst="rect">
             <a:avLst/>
@@ -7413,7 +7421,7 @@
           <a:lstStyle/>
           <a:p>
             <a:r>
-              <a:rPr lang="nb-NO" sz="1400" dirty="0" smtClean="0">
+              <a:rPr lang="nb-NO" dirty="0" smtClean="0">
                 <a:solidFill>
                   <a:schemeClr val="bg2">
                     <a:lumMod val="75000"/>
@@ -7422,7 +7430,7 @@
               </a:rPr>
               <a:t>Sven Malvik</a:t>
             </a:r>
-            <a:endParaRPr lang="en-US" sz="1400" dirty="0">
+            <a:endParaRPr lang="en-US" dirty="0">
               <a:solidFill>
                 <a:schemeClr val="bg2">
                   <a:lumMod val="75000"/>
@@ -7440,8 +7448,8 @@
         </p:nvSpPr>
         <p:spPr>
           <a:xfrm>
-            <a:off x="820044" y="2962528"/>
-            <a:ext cx="1624355" cy="830997"/>
+            <a:off x="504358" y="2962527"/>
+            <a:ext cx="1864293" cy="954107"/>
           </a:xfrm>
           <a:prstGeom prst="rect">
             <a:avLst/>
@@ -7456,7 +7464,7 @@
           <a:p>
             <a:pPr algn="ctr"/>
             <a:r>
-              <a:rPr lang="nb-NO" sz="2400" b="1" dirty="0" err="1" smtClean="0">
+              <a:rPr lang="nb-NO" sz="2800" dirty="0" err="1" smtClean="0">
                 <a:solidFill>
                   <a:srgbClr val="44811B"/>
                 </a:solidFill>
@@ -7464,7 +7472,7 @@
               <a:t>Monitoring</a:t>
             </a:r>
             <a:r>
-              <a:rPr lang="nb-NO" sz="2400" b="1" dirty="0" smtClean="0">
+              <a:rPr lang="nb-NO" sz="2800" dirty="0" smtClean="0">
                 <a:solidFill>
                   <a:srgbClr val="44811B"/>
                 </a:solidFill>
@@ -7472,21 +7480,21 @@
               <a:t/>
             </a:r>
             <a:br>
-              <a:rPr lang="nb-NO" sz="2400" b="1" dirty="0" smtClean="0">
+              <a:rPr lang="nb-NO" sz="2800" dirty="0" smtClean="0">
                 <a:solidFill>
                   <a:srgbClr val="44811B"/>
                 </a:solidFill>
               </a:rPr>
             </a:br>
             <a:r>
-              <a:rPr lang="nb-NO" sz="2400" b="1" dirty="0" err="1" smtClean="0">
+              <a:rPr lang="nb-NO" sz="2800" dirty="0" err="1" smtClean="0">
                 <a:solidFill>
                   <a:srgbClr val="44811B"/>
                 </a:solidFill>
               </a:rPr>
               <a:t>Metrics</a:t>
             </a:r>
-            <a:endParaRPr lang="en-US" sz="2400" b="1" dirty="0">
+            <a:endParaRPr lang="en-US" sz="2800" dirty="0">
               <a:solidFill>
                 <a:srgbClr val="44811B"/>
               </a:solidFill>
@@ -7502,8 +7510,8 @@
         </p:nvSpPr>
         <p:spPr>
           <a:xfrm>
-            <a:off x="3944370" y="2962527"/>
-            <a:ext cx="1896866" cy="830997"/>
+            <a:off x="4020693" y="2962527"/>
+            <a:ext cx="2181239" cy="954107"/>
           </a:xfrm>
           <a:prstGeom prst="rect">
             <a:avLst/>
@@ -7518,7 +7526,7 @@
           <a:p>
             <a:pPr algn="ctr"/>
             <a:r>
-              <a:rPr lang="nb-NO" sz="2400" b="1" dirty="0" err="1" smtClean="0">
+              <a:rPr lang="nb-NO" sz="2800" dirty="0" err="1" smtClean="0">
                 <a:solidFill>
                   <a:srgbClr val="44811B"/>
                 </a:solidFill>
@@ -7526,7 +7534,7 @@
               <a:t>Lifecycle</a:t>
             </a:r>
             <a:r>
-              <a:rPr lang="en-US" sz="2400" b="1" dirty="0" smtClean="0">
+              <a:rPr lang="en-US" sz="2800" dirty="0" smtClean="0">
                 <a:solidFill>
                   <a:srgbClr val="44811B"/>
                 </a:solidFill>
@@ -7534,21 +7542,21 @@
               <a:t/>
             </a:r>
             <a:br>
-              <a:rPr lang="en-US" sz="2400" b="1" dirty="0" smtClean="0">
+              <a:rPr lang="en-US" sz="2800" dirty="0" smtClean="0">
                 <a:solidFill>
                   <a:srgbClr val="44811B"/>
                 </a:solidFill>
               </a:rPr>
             </a:br>
             <a:r>
-              <a:rPr lang="en-US" sz="2400" b="1" dirty="0" smtClean="0">
+              <a:rPr lang="en-US" sz="2800" dirty="0" smtClean="0">
                 <a:solidFill>
                   <a:srgbClr val="44811B"/>
                 </a:solidFill>
               </a:rPr>
               <a:t>Management</a:t>
             </a:r>
-            <a:endParaRPr lang="nb-NO" sz="2400" b="1" dirty="0" smtClean="0">
+            <a:endParaRPr lang="nb-NO" sz="2800" dirty="0" smtClean="0">
               <a:solidFill>
                 <a:srgbClr val="44811B"/>
               </a:solidFill>

</xml_diff>